<commit_message>
Update presentation files 15_github_basics.pptx and 16_collaboration.pptx to enhance content quality and ensure consistency across bootcamp topics.
</commit_message>
<xml_diff>
--- a/.slides/topics/15_github_basics.pptx
+++ b/.slides/topics/15_github_basics.pptx
@@ -17,6 +17,7 @@
     <p:sldId id="265" r:id="rId11"/>
     <p:sldId id="266" r:id="rId12"/>
     <p:sldId id="267" r:id="rId13"/>
+    <p:sldId id="271" r:id="rId14"/>
   </p:sldIdLst>
   <p:sldSz cx="12192000" cy="6858000"/>
   <p:notesSz cx="6858000" cy="9144000"/>
@@ -3482,6 +3483,53 @@
           </a:p>
         </p:txBody>
       </p:sp>
+      <p:pic>
+        <p:nvPicPr>
+          <p:cNvPr id="1026" name="Picture 2">
+            <a:extLst>
+              <a:ext uri="{FF2B5EF4-FFF2-40B4-BE49-F238E27FC236}">
+                <a16:creationId xmlns:a16="http://schemas.microsoft.com/office/drawing/2014/main" id="{4CA40E17-8C67-444B-74D1-3106BD339452}"/>
+              </a:ext>
+            </a:extLst>
+          </p:cNvPr>
+          <p:cNvPicPr>
+            <a:picLocks noChangeAspect="1" noChangeArrowheads="1"/>
+          </p:cNvPicPr>
+          <p:nvPr/>
+        </p:nvPicPr>
+        <p:blipFill>
+          <a:blip r:embed="rId3">
+            <a:extLst>
+              <a:ext uri="{28A0092B-C50C-407E-A947-70E740481C1C}">
+                <a14:useLocalDpi xmlns:a14="http://schemas.microsoft.com/office/drawing/2010/main" val="0"/>
+              </a:ext>
+            </a:extLst>
+          </a:blip>
+          <a:srcRect/>
+          <a:stretch>
+            <a:fillRect/>
+          </a:stretch>
+        </p:blipFill>
+        <p:spPr bwMode="auto">
+          <a:xfrm>
+            <a:off x="9382910" y="452047"/>
+            <a:ext cx="2400000" cy="3600000"/>
+          </a:xfrm>
+          <a:prstGeom prst="rect">
+            <a:avLst/>
+          </a:prstGeom>
+          <a:noFill/>
+          <a:extLst>
+            <a:ext uri="{909E8E84-426E-40DD-AFC4-6F175D3DCCD1}">
+              <a14:hiddenFill xmlns:a14="http://schemas.microsoft.com/office/drawing/2010/main">
+                <a:solidFill>
+                  <a:srgbClr val="FFFFFF"/>
+                </a:solidFill>
+              </a14:hiddenFill>
+            </a:ext>
+          </a:extLst>
+        </p:spPr>
+      </p:pic>
     </p:spTree>
   </p:cSld>
   <p:clrMapOvr>
@@ -3793,6 +3841,97 @@
 </p:sld>
 </file>
 
+<file path=ppt/slides/slide13.xml><?xml version="1.0" encoding="utf-8"?>
+<p:sld xmlns:a="http://schemas.openxmlformats.org/drawingml/2006/main" xmlns:r="http://schemas.openxmlformats.org/officeDocument/2006/relationships" xmlns:p="http://schemas.openxmlformats.org/presentationml/2006/main">
+  <p:cSld>
+    <p:spTree>
+      <p:nvGrpSpPr>
+        <p:cNvPr id="1" name=""/>
+        <p:cNvGrpSpPr/>
+        <p:nvPr/>
+      </p:nvGrpSpPr>
+      <p:grpSpPr>
+        <a:xfrm>
+          <a:off x="0" y="0"/>
+          <a:ext cx="0" cy="0"/>
+          <a:chOff x="0" y="0"/>
+          <a:chExt cx="0" cy="0"/>
+        </a:xfrm>
+      </p:grpSpPr>
+      <p:sp>
+        <p:nvSpPr>
+          <p:cNvPr id="2" name="Title 1">
+            <a:extLst>
+              <a:ext uri="{FF2B5EF4-FFF2-40B4-BE49-F238E27FC236}">
+                <a16:creationId xmlns:a16="http://schemas.microsoft.com/office/drawing/2014/main" id="{8525C2D7-E417-70EE-D336-6C2729628304}"/>
+              </a:ext>
+            </a:extLst>
+          </p:cNvPr>
+          <p:cNvSpPr>
+            <a:spLocks noGrp="1"/>
+          </p:cNvSpPr>
+          <p:nvPr>
+            <p:ph type="title"/>
+          </p:nvPr>
+        </p:nvSpPr>
+        <p:spPr/>
+        <p:txBody>
+          <a:bodyPr/>
+          <a:lstStyle/>
+          <a:p>
+            <a:pPr marL="0" lvl="0" indent="0">
+              <a:buNone/>
+            </a:pPr>
+            <a:r>
+              <a:t>Practice Exercises</a:t>
+            </a:r>
+          </a:p>
+        </p:txBody>
+      </p:sp>
+      <p:pic>
+        <p:nvPicPr>
+          <p:cNvPr id="6" name="Picture 5" descr="A cat sitting on a computer&#10;&#10;AI-generated content may be incorrect.">
+            <a:extLst>
+              <a:ext uri="{FF2B5EF4-FFF2-40B4-BE49-F238E27FC236}">
+                <a16:creationId xmlns:a16="http://schemas.microsoft.com/office/drawing/2014/main" id="{D2E0F507-A649-BEC3-934D-D62F9A7982A2}"/>
+              </a:ext>
+            </a:extLst>
+          </p:cNvPr>
+          <p:cNvPicPr>
+            <a:picLocks noChangeAspect="1"/>
+          </p:cNvPicPr>
+          <p:nvPr/>
+        </p:nvPicPr>
+        <p:blipFill>
+          <a:blip r:embed="rId2">
+            <a:extLst>
+              <a:ext uri="{28A0092B-C50C-407E-A947-70E740481C1C}">
+                <a14:useLocalDpi xmlns:a14="http://schemas.microsoft.com/office/drawing/2010/main" val="0"/>
+              </a:ext>
+            </a:extLst>
+          </a:blip>
+          <a:stretch>
+            <a:fillRect/>
+          </a:stretch>
+        </p:blipFill>
+        <p:spPr>
+          <a:xfrm>
+            <a:off x="2154453" y="1417320"/>
+            <a:ext cx="7883093" cy="5255395"/>
+          </a:xfrm>
+          <a:prstGeom prst="rect">
+            <a:avLst/>
+          </a:prstGeom>
+        </p:spPr>
+      </p:pic>
+    </p:spTree>
+  </p:cSld>
+  <p:clrMapOvr>
+    <a:masterClrMapping/>
+  </p:clrMapOvr>
+</p:sld>
+</file>
+
 <file path=ppt/slides/slide2.xml><?xml version="1.0" encoding="utf-8"?>
 <p:sld xmlns:a="http://schemas.openxmlformats.org/drawingml/2006/main" xmlns:r="http://schemas.openxmlformats.org/officeDocument/2006/relationships" xmlns:p="http://schemas.openxmlformats.org/presentationml/2006/main">
   <p:cSld>
@@ -4189,6 +4328,78 @@
           </a:p>
         </p:txBody>
       </p:sp>
+      <p:pic>
+        <p:nvPicPr>
+          <p:cNvPr id="7" name="Picture 6" descr="A logo of a cat&#10;&#10;AI-generated content may be incorrect.">
+            <a:extLst>
+              <a:ext uri="{FF2B5EF4-FFF2-40B4-BE49-F238E27FC236}">
+                <a16:creationId xmlns:a16="http://schemas.microsoft.com/office/drawing/2014/main" id="{BB304E97-2BEF-E516-A412-E26CA3610CB0}"/>
+              </a:ext>
+            </a:extLst>
+          </p:cNvPr>
+          <p:cNvPicPr>
+            <a:picLocks noChangeAspect="1"/>
+          </p:cNvPicPr>
+          <p:nvPr/>
+        </p:nvPicPr>
+        <p:blipFill>
+          <a:blip r:embed="rId2">
+            <a:extLst>
+              <a:ext uri="{28A0092B-C50C-407E-A947-70E740481C1C}">
+                <a14:useLocalDpi xmlns:a14="http://schemas.microsoft.com/office/drawing/2010/main" val="0"/>
+              </a:ext>
+            </a:extLst>
+          </a:blip>
+          <a:stretch>
+            <a:fillRect/>
+          </a:stretch>
+        </p:blipFill>
+        <p:spPr>
+          <a:xfrm>
+            <a:off x="7568985" y="4283242"/>
+            <a:ext cx="2173562" cy="2028658"/>
+          </a:xfrm>
+          <a:prstGeom prst="rect">
+            <a:avLst/>
+          </a:prstGeom>
+        </p:spPr>
+      </p:pic>
+      <p:pic>
+        <p:nvPicPr>
+          <p:cNvPr id="9" name="Picture 8" descr="A logo with a black background&#10;&#10;AI-generated content may be incorrect.">
+            <a:extLst>
+              <a:ext uri="{FF2B5EF4-FFF2-40B4-BE49-F238E27FC236}">
+                <a16:creationId xmlns:a16="http://schemas.microsoft.com/office/drawing/2014/main" id="{20CE2D28-C72C-4958-C9AF-708432BE449C}"/>
+              </a:ext>
+            </a:extLst>
+          </p:cNvPr>
+          <p:cNvPicPr>
+            <a:picLocks noChangeAspect="1"/>
+          </p:cNvPicPr>
+          <p:nvPr/>
+        </p:nvPicPr>
+        <p:blipFill>
+          <a:blip r:embed="rId3">
+            <a:extLst>
+              <a:ext uri="{28A0092B-C50C-407E-A947-70E740481C1C}">
+                <a14:useLocalDpi xmlns:a14="http://schemas.microsoft.com/office/drawing/2010/main" val="0"/>
+              </a:ext>
+            </a:extLst>
+          </a:blip>
+          <a:stretch>
+            <a:fillRect/>
+          </a:stretch>
+        </p:blipFill>
+        <p:spPr>
+          <a:xfrm>
+            <a:off x="2197462" y="5037803"/>
+            <a:ext cx="3048307" cy="1274097"/>
+          </a:xfrm>
+          <a:prstGeom prst="rect">
+            <a:avLst/>
+          </a:prstGeom>
+        </p:spPr>
+      </p:pic>
     </p:spTree>
   </p:cSld>
   <p:clrMapOvr>
@@ -4488,6 +4699,41 @@
             <a:pPr lvl="0"/>
             <a:r>
               <a:t>Initialize with README and appropriate settings</a:t>
+            </a:r>
+          </a:p>
+        </p:txBody>
+      </p:sp>
+      <p:sp>
+        <p:nvSpPr>
+          <p:cNvPr id="4" name="TextBox 3">
+            <a:extLst>
+              <a:ext uri="{FF2B5EF4-FFF2-40B4-BE49-F238E27FC236}">
+                <a16:creationId xmlns:a16="http://schemas.microsoft.com/office/drawing/2014/main" id="{29B1E414-6B4E-18F2-648A-37C7CBF06CF3}"/>
+              </a:ext>
+            </a:extLst>
+          </p:cNvPr>
+          <p:cNvSpPr txBox="1"/>
+          <p:nvPr/>
+        </p:nvSpPr>
+        <p:spPr>
+          <a:xfrm>
+            <a:off x="3927107" y="4754880"/>
+            <a:ext cx="3774110" cy="646331"/>
+          </a:xfrm>
+          <a:prstGeom prst="rect">
+            <a:avLst/>
+          </a:prstGeom>
+          <a:noFill/>
+        </p:spPr>
+        <p:txBody>
+          <a:bodyPr wrap="none" rtlCol="0">
+            <a:spAutoFit/>
+          </a:bodyPr>
+          <a:lstStyle/>
+          <a:p>
+            <a:r>
+              <a:rPr lang="en-GB" sz="3600" b="1" dirty="0"/>
+              <a:t>&lt;demonstration&gt;</a:t>
             </a:r>
           </a:p>
         </p:txBody>

</xml_diff>